<commit_message>
Changed welcome slides. Fixed relative file paths.
</commit_message>
<xml_diff>
--- a/Workshops/WelcomePresentation.pptx
+++ b/Workshops/WelcomePresentation.pptx
@@ -927,6 +927,198 @@
             <a:r>
               <a:rPr/>
               <a:t>slide.</a:t>
+            </a:r>
+            <a:r>
+              <a:rPr/>
+              <a:t> </a:t>
+            </a:r>
+            <a:r>
+              <a:rPr/>
+              <a:t>Tell</a:t>
+            </a:r>
+            <a:r>
+              <a:rPr/>
+              <a:t> </a:t>
+            </a:r>
+            <a:r>
+              <a:rPr/>
+              <a:t>people</a:t>
+            </a:r>
+            <a:r>
+              <a:rPr/>
+              <a:t> </a:t>
+            </a:r>
+            <a:r>
+              <a:rPr/>
+              <a:t>that</a:t>
+            </a:r>
+            <a:r>
+              <a:rPr/>
+              <a:t> </a:t>
+            </a:r>
+            <a:r>
+              <a:rPr/>
+              <a:t>they</a:t>
+            </a:r>
+            <a:r>
+              <a:rPr/>
+              <a:t> </a:t>
+            </a:r>
+            <a:r>
+              <a:rPr/>
+              <a:t>can</a:t>
+            </a:r>
+            <a:r>
+              <a:rPr/>
+              <a:t> </a:t>
+            </a:r>
+            <a:r>
+              <a:rPr/>
+              <a:t>sign</a:t>
+            </a:r>
+            <a:r>
+              <a:rPr/>
+              <a:t> </a:t>
+            </a:r>
+            <a:r>
+              <a:rPr/>
+              <a:t>the</a:t>
+            </a:r>
+            <a:r>
+              <a:rPr/>
+              <a:t> </a:t>
+            </a:r>
+            <a:r>
+              <a:rPr/>
+              <a:t>CCHIC</a:t>
+            </a:r>
+            <a:r>
+              <a:rPr/>
+              <a:t> </a:t>
+            </a:r>
+            <a:r>
+              <a:rPr/>
+              <a:t>user</a:t>
+            </a:r>
+            <a:r>
+              <a:rPr/>
+              <a:t> </a:t>
+            </a:r>
+            <a:r>
+              <a:rPr/>
+              <a:t>sharing</a:t>
+            </a:r>
+            <a:r>
+              <a:rPr/>
+              <a:t> </a:t>
+            </a:r>
+            <a:r>
+              <a:rPr/>
+              <a:t>agreement</a:t>
+            </a:r>
+            <a:r>
+              <a:rPr/>
+              <a:t> </a:t>
+            </a:r>
+            <a:r>
+              <a:rPr/>
+              <a:t>if</a:t>
+            </a:r>
+            <a:r>
+              <a:rPr/>
+              <a:t> </a:t>
+            </a:r>
+            <a:r>
+              <a:rPr/>
+              <a:t>they</a:t>
+            </a:r>
+            <a:r>
+              <a:rPr/>
+              <a:t> </a:t>
+            </a:r>
+            <a:r>
+              <a:rPr/>
+              <a:t>want</a:t>
+            </a:r>
+            <a:r>
+              <a:rPr/>
+              <a:t> </a:t>
+            </a:r>
+            <a:r>
+              <a:rPr/>
+              <a:t>to</a:t>
+            </a:r>
+            <a:r>
+              <a:rPr/>
+              <a:t> </a:t>
+            </a:r>
+            <a:r>
+              <a:rPr/>
+              <a:t>access</a:t>
+            </a:r>
+            <a:r>
+              <a:rPr/>
+              <a:t> </a:t>
+            </a:r>
+            <a:r>
+              <a:rPr/>
+              <a:t>the</a:t>
+            </a:r>
+            <a:r>
+              <a:rPr/>
+              <a:t> </a:t>
+            </a:r>
+            <a:r>
+              <a:rPr/>
+              <a:t>full</a:t>
+            </a:r>
+            <a:r>
+              <a:rPr/>
+              <a:t> </a:t>
+            </a:r>
+            <a:r>
+              <a:rPr/>
+              <a:t>public</a:t>
+            </a:r>
+            <a:r>
+              <a:rPr/>
+              <a:t> </a:t>
+            </a:r>
+            <a:r>
+              <a:rPr/>
+              <a:t>dataset</a:t>
+            </a:r>
+            <a:r>
+              <a:rPr/>
+              <a:t> </a:t>
+            </a:r>
+            <a:r>
+              <a:rPr/>
+              <a:t>to</a:t>
+            </a:r>
+            <a:r>
+              <a:rPr/>
+              <a:t> </a:t>
+            </a:r>
+            <a:r>
+              <a:rPr/>
+              <a:t>play</a:t>
+            </a:r>
+            <a:r>
+              <a:rPr/>
+              <a:t> </a:t>
+            </a:r>
+            <a:r>
+              <a:rPr/>
+              <a:t>with</a:t>
+            </a:r>
+            <a:r>
+              <a:rPr/>
+              <a:t> </a:t>
+            </a:r>
+            <a:r>
+              <a:rPr/>
+              <a:t>later.</a:t>
             </a:r>
           </a:p>
         </p:txBody>
@@ -4590,7 +4782,7 @@
       </p:grpSpPr>
       <p:pic>
         <p:nvPicPr>
-          <p:cNvPr descr="Images/Clinician%20Coders%20Branding_FINAL_CMYK_Colour.png" id="0" name="Picture 1"/>
+          <p:cNvPr descr="../Images/Clinician%20Coders%20Branding_FINAL_CMYK_Colour.png" id="0" name="Picture 1"/>
           <p:cNvPicPr>
             <a:picLocks noGrp="1" noChangeAspect="1"/>
           </p:cNvPicPr>
@@ -4833,14 +5025,14 @@
             <a:pPr lvl="1"/>
             <a:r>
               <a:rPr/>
-              <a:t>Sign user agreement for CCHIC</a:t>
+              <a:t>Join the slack channel</a:t>
             </a:r>
           </a:p>
           <a:p>
             <a:pPr lvl="1"/>
             <a:r>
               <a:rPr/>
-              <a:t>Join the slack channel</a:t>
+              <a:t>Decide which dataset to use on the second day</a:t>
             </a:r>
           </a:p>
         </p:txBody>
@@ -5358,7 +5550,7 @@
             <a:pPr lvl="1"/>
             <a:r>
               <a:rPr/>
-              <a:t>Extract of single admission time point for 1011 patients for Clinician Coders</a:t>
+              <a:t>You will be using a small annonymised extract from this dataset for the first part of the course.</a:t>
             </a:r>
           </a:p>
         </p:txBody>

</xml_diff>